<commit_message>
slight change to slides
</commit_message>
<xml_diff>
--- a/src/pages/events/2024-03-15/slides/00-index.pptx
+++ b/src/pages/events/2024-03-15/slides/00-index.pptx
@@ -609,7 +609,7 @@
           <a:p>
             <a:fld id="{6D2A0333-042B-6B44-A752-FAF2BCB7C72B}" type="datetimeFigureOut">
               <a:rPr kumimoji="1" lang="ja-JP" altLang="en-US" smtClean="0"/>
-              <a:t>2024/3/14</a:t>
+              <a:t>2024/3/15</a:t>
             </a:fld>
             <a:endParaRPr kumimoji="1" lang="ja-JP" altLang="en-US"/>
           </a:p>
@@ -5659,11 +5659,11 @@
             </a:r>
             <a:r>
               <a:rPr lang="ja-JP" altLang="en-US" sz="2200" dirty="0"/>
-              <a:t>（田浦 </a:t>
-            </a:r>
-            <a:r>
-              <a:rPr lang="en-US" altLang="ja-JP" sz="2400" dirty="0"/>
-              <a:t>40</a:t>
+              <a:t>（田浦</a:t>
+            </a:r>
+            <a:r>
+              <a:rPr lang="en-US" altLang="ja-JP" sz="2200"/>
+              <a:t>50</a:t>
             </a:r>
             <a:r>
               <a:rPr lang="ja-JP" altLang="en-US" sz="2400" dirty="0"/>
@@ -5809,7 +5809,7 @@
           </a:p>
           <a:p>
             <a:r>
-              <a:rPr lang="ja-JP" altLang="en-US"/>
+              <a:rPr lang="ja-JP" altLang="en-US" dirty="0"/>
               <a:t>質問 </a:t>
             </a:r>
             <a:r>

</xml_diff>